<commit_message>
TS 7.1 Kramam Tamil - 06/04/2022
</commit_message>
<xml_diff>
--- a/Veda Lectures/Dheerga Swaritam.pptx
+++ b/Veda Lectures/Dheerga Swaritam.pptx
@@ -7,6 +7,12 @@
   <p:sldIdLst>
     <p:sldId id="256" r:id="rId2"/>
     <p:sldId id="257" r:id="rId3"/>
+    <p:sldId id="258" r:id="rId4"/>
+    <p:sldId id="259" r:id="rId5"/>
+    <p:sldId id="260" r:id="rId6"/>
+    <p:sldId id="261" r:id="rId7"/>
+    <p:sldId id="262" r:id="rId8"/>
+    <p:sldId id="263" r:id="rId9"/>
   </p:sldIdLst>
   <p:sldSz cx="12192000" cy="6858000"/>
   <p:notesSz cx="6858000" cy="9144000"/>
@@ -449,7 +455,7 @@
             <a:fld id="{5923F103-BC34-4FE4-A40E-EDDEECFDA5D0}" type="datetimeFigureOut">
               <a:rPr lang="en-US" dirty="0"/>
               <a:pPr/>
-              <a:t>1/31/2022</a:t>
+              <a:t>4/5/2022</a:t>
             </a:fld>
             <a:endParaRPr lang="en-US" dirty="0"/>
           </a:p>
@@ -1537,7 +1543,7 @@
           <a:p>
             <a:fld id="{923A1CC3-2375-41D4-9E03-427CAF2A4C1A}" type="datetimeFigureOut">
               <a:rPr lang="en-US" dirty="0"/>
-              <a:t>1/31/2022</a:t>
+              <a:t>4/5/2022</a:t>
             </a:fld>
             <a:endParaRPr lang="en-US" dirty="0"/>
           </a:p>
@@ -2517,7 +2523,7 @@
           <a:p>
             <a:fld id="{AFF16868-8199-4C2C-A5B1-63AEE139F88E}" type="datetimeFigureOut">
               <a:rPr lang="en-US" dirty="0"/>
-              <a:t>1/31/2022</a:t>
+              <a:t>4/5/2022</a:t>
             </a:fld>
             <a:endParaRPr lang="en-US" dirty="0"/>
           </a:p>
@@ -3651,7 +3657,7 @@
           <a:p>
             <a:fld id="{AAD9FF7F-6988-44CC-821B-644E70CD2F73}" type="datetimeFigureOut">
               <a:rPr lang="en-US" dirty="0"/>
-              <a:t>1/31/2022</a:t>
+              <a:t>4/5/2022</a:t>
             </a:fld>
             <a:endParaRPr lang="en-US" dirty="0"/>
           </a:p>
@@ -4684,7 +4690,7 @@
           <a:p>
             <a:fld id="{5C12C299-16B2-4475-990D-751901EACC14}" type="datetimeFigureOut">
               <a:rPr lang="en-US" dirty="0"/>
-              <a:t>1/31/2022</a:t>
+              <a:t>4/5/2022</a:t>
             </a:fld>
             <a:endParaRPr lang="en-US" dirty="0"/>
           </a:p>
@@ -5344,7 +5350,7 @@
           <a:p>
             <a:fld id="{9FE86839-B9D8-4651-8783-F325ECE74E65}" type="datetimeFigureOut">
               <a:rPr lang="en-US" dirty="0"/>
-              <a:t>1/31/2022</a:t>
+              <a:t>4/5/2022</a:t>
             </a:fld>
             <a:endParaRPr lang="en-US" dirty="0"/>
           </a:p>
@@ -6205,7 +6211,7 @@
           <a:p>
             <a:fld id="{FD484F64-32F6-45C5-931F-ADC1662401D0}" type="datetimeFigureOut">
               <a:rPr lang="en-US" dirty="0"/>
-              <a:t>1/31/2022</a:t>
+              <a:t>4/5/2022</a:t>
             </a:fld>
             <a:endParaRPr lang="en-US" dirty="0"/>
           </a:p>
@@ -6395,7 +6401,7 @@
           <a:p>
             <a:fld id="{53086D93-FCAC-47E0-A2EE-787E62CA814C}" type="datetimeFigureOut">
               <a:rPr lang="en-US" dirty="0"/>
-              <a:t>1/31/2022</a:t>
+              <a:t>4/5/2022</a:t>
             </a:fld>
             <a:endParaRPr lang="en-US" dirty="0"/>
           </a:p>
@@ -7367,7 +7373,7 @@
           <a:p>
             <a:fld id="{CDA879A6-0FD0-4734-A311-86BFCA472E6E}" type="datetimeFigureOut">
               <a:rPr lang="en-US" dirty="0"/>
-              <a:t>1/31/2022</a:t>
+              <a:t>4/5/2022</a:t>
             </a:fld>
             <a:endParaRPr lang="en-US" dirty="0"/>
           </a:p>
@@ -7578,7 +7584,7 @@
           <a:p>
             <a:fld id="{19C9CA7B-DFD4-44B5-8C60-D14B8CD1FB59}" type="datetimeFigureOut">
               <a:rPr lang="en-US" dirty="0"/>
-              <a:t>1/31/2022</a:t>
+              <a:t>4/5/2022</a:t>
             </a:fld>
             <a:endParaRPr lang="en-US" dirty="0"/>
           </a:p>
@@ -8612,7 +8618,7 @@
           <a:p>
             <a:fld id="{F34E6425-0181-43F2-84FC-787E803FD2F8}" type="datetimeFigureOut">
               <a:rPr lang="en-US" dirty="0"/>
-              <a:t>1/31/2022</a:t>
+              <a:t>4/5/2022</a:t>
             </a:fld>
             <a:endParaRPr lang="en-US" dirty="0"/>
           </a:p>
@@ -8884,7 +8890,7 @@
           <a:p>
             <a:fld id="{3BDB8791-F1B0-41E7-B7FD-A781E65C4266}" type="datetimeFigureOut">
               <a:rPr lang="en-US" dirty="0"/>
-              <a:t>1/31/2022</a:t>
+              <a:t>4/5/2022</a:t>
             </a:fld>
             <a:endParaRPr lang="en-US" dirty="0"/>
           </a:p>
@@ -9294,7 +9300,7 @@
           <a:p>
             <a:fld id="{5FDD63B2-E120-4ED8-B27B-C685F510A5FE}" type="datetimeFigureOut">
               <a:rPr lang="en-US" dirty="0"/>
-              <a:t>1/31/2022</a:t>
+              <a:t>4/5/2022</a:t>
             </a:fld>
             <a:endParaRPr lang="en-US" dirty="0"/>
           </a:p>
@@ -9421,7 +9427,7 @@
           <a:p>
             <a:fld id="{7AA18ACC-A947-437B-A130-35BD54FDF1E9}" type="datetimeFigureOut">
               <a:rPr lang="en-US" dirty="0"/>
-              <a:t>1/31/2022</a:t>
+              <a:t>4/5/2022</a:t>
             </a:fld>
             <a:endParaRPr lang="en-US" dirty="0"/>
           </a:p>
@@ -9516,7 +9522,7 @@
           <a:p>
             <a:fld id="{7C8D7E02-BCB8-4D50-A234-369438C08659}" type="datetimeFigureOut">
               <a:rPr lang="en-US" dirty="0"/>
-              <a:t>1/31/2022</a:t>
+              <a:t>4/5/2022</a:t>
             </a:fld>
             <a:endParaRPr lang="en-US" dirty="0"/>
           </a:p>
@@ -10597,7 +10603,7 @@
           <a:p>
             <a:fld id="{76E86A4C-8E40-4F87-A4F0-01A0687C5742}" type="datetimeFigureOut">
               <a:rPr lang="en-US" dirty="0"/>
-              <a:t>1/31/2022</a:t>
+              <a:t>4/5/2022</a:t>
             </a:fld>
             <a:endParaRPr lang="en-US" dirty="0"/>
           </a:p>
@@ -11705,7 +11711,7 @@
           <a:p>
             <a:fld id="{35E72C73-2D91-4E12-BA25-F0AA0C03599B}" type="datetimeFigureOut">
               <a:rPr lang="en-US" dirty="0"/>
-              <a:t>1/31/2022</a:t>
+              <a:t>4/5/2022</a:t>
             </a:fld>
             <a:endParaRPr lang="en-US" dirty="0"/>
           </a:p>
@@ -12702,7 +12708,7 @@
           <a:p>
             <a:fld id="{2BE451C3-0FF4-47C4-B829-773ADF60F88C}" type="datetimeFigureOut">
               <a:rPr lang="en-US" dirty="0"/>
-              <a:t>1/31/2022</a:t>
+              <a:t>4/5/2022</a:t>
             </a:fld>
             <a:endParaRPr lang="en-US" dirty="0"/>
           </a:p>
@@ -13371,7 +13377,7 @@
         <p:spPr>
           <a:xfrm>
             <a:off x="1407886" y="2394857"/>
-            <a:ext cx="8979127" cy="3958771"/>
+            <a:ext cx="9754100" cy="4463143"/>
           </a:xfrm>
         </p:spPr>
         <p:txBody>
@@ -13380,10 +13386,75 @@
           </a:bodyPr>
           <a:lstStyle/>
           <a:p>
-            <a:endParaRPr lang="en-US" sz="2800" b="1" dirty="0">
-              <a:latin typeface="Arial" panose="020B0604020202020204" pitchFamily="34" charset="0"/>
-              <a:cs typeface="Arial" panose="020B0604020202020204" pitchFamily="34" charset="0"/>
-            </a:endParaRPr>
+            <a:r>
+              <a:rPr lang="en-US" sz="2800" b="1" dirty="0">
+                <a:latin typeface="Arial" panose="020B0604020202020204" pitchFamily="34" charset="0"/>
+                <a:cs typeface="Arial" panose="020B0604020202020204" pitchFamily="34" charset="0"/>
+              </a:rPr>
+              <a:t>Basic definition</a:t>
+            </a:r>
+          </a:p>
+          <a:p>
+            <a:pPr lvl="1"/>
+            <a:r>
+              <a:rPr lang="en-US" sz="2600" b="1" dirty="0">
+                <a:latin typeface="Arial" panose="020B0604020202020204" pitchFamily="34" charset="0"/>
+                <a:cs typeface="Arial" panose="020B0604020202020204" pitchFamily="34" charset="0"/>
+              </a:rPr>
+              <a:t>Swaritam rendered at twice the time scale</a:t>
+            </a:r>
+          </a:p>
+          <a:p>
+            <a:pPr lvl="1"/>
+            <a:r>
+              <a:rPr lang="en-US" sz="2600" b="1" dirty="0">
+                <a:latin typeface="Arial" panose="020B0604020202020204" pitchFamily="34" charset="0"/>
+                <a:cs typeface="Arial" panose="020B0604020202020204" pitchFamily="34" charset="0"/>
+              </a:rPr>
+              <a:t>Marking in old books with single vertical line</a:t>
+            </a:r>
+          </a:p>
+          <a:p>
+            <a:pPr lvl="1"/>
+            <a:r>
+              <a:rPr lang="en-US" sz="2600" b="1" dirty="0">
+                <a:latin typeface="Arial" panose="020B0604020202020204" pitchFamily="34" charset="0"/>
+                <a:cs typeface="Arial" panose="020B0604020202020204" pitchFamily="34" charset="0"/>
+              </a:rPr>
+              <a:t>Not applicable to gm and gg</a:t>
+            </a:r>
+          </a:p>
+          <a:p>
+            <a:r>
+              <a:rPr lang="en-US" sz="2800" b="1" dirty="0">
+                <a:latin typeface="Arial" panose="020B0604020202020204" pitchFamily="34" charset="0"/>
+                <a:cs typeface="Arial" panose="020B0604020202020204" pitchFamily="34" charset="0"/>
+              </a:rPr>
+              <a:t>There are differences between Krishna </a:t>
+            </a:r>
+            <a:r>
+              <a:rPr lang="en-US" sz="2800" b="1" dirty="0" err="1">
+                <a:latin typeface="Arial" panose="020B0604020202020204" pitchFamily="34" charset="0"/>
+                <a:cs typeface="Arial" panose="020B0604020202020204" pitchFamily="34" charset="0"/>
+              </a:rPr>
+              <a:t>Yajur</a:t>
+            </a:r>
+            <a:r>
+              <a:rPr lang="en-US" sz="2800" b="1" dirty="0">
+                <a:latin typeface="Arial" panose="020B0604020202020204" pitchFamily="34" charset="0"/>
+                <a:cs typeface="Arial" panose="020B0604020202020204" pitchFamily="34" charset="0"/>
+              </a:rPr>
+              <a:t> Veda and other branches</a:t>
+            </a:r>
+          </a:p>
+          <a:p>
+            <a:r>
+              <a:rPr lang="en-US" sz="2800" b="1" dirty="0">
+                <a:latin typeface="Arial" panose="020B0604020202020204" pitchFamily="34" charset="0"/>
+                <a:cs typeface="Arial" panose="020B0604020202020204" pitchFamily="34" charset="0"/>
+              </a:rPr>
+              <a:t>Application of Swaritam in KYV of texts from Ruk Veda may vary between Schools</a:t>
+            </a:r>
           </a:p>
         </p:txBody>
       </p:sp>
@@ -13391,6 +13462,1253 @@
     <p:extLst>
       <p:ext uri="{BB962C8B-B14F-4D97-AF65-F5344CB8AC3E}">
         <p14:creationId xmlns:p14="http://schemas.microsoft.com/office/powerpoint/2010/main" val="3063240222"/>
+      </p:ext>
+    </p:extLst>
+  </p:cSld>
+  <p:clrMapOvr>
+    <a:masterClrMapping/>
+  </p:clrMapOvr>
+</p:sld>
+</file>
+
+<file path=ppt/slides/slide3.xml><?xml version="1.0" encoding="utf-8"?>
+<p:sld xmlns:a="http://schemas.openxmlformats.org/drawingml/2006/main" xmlns:r="http://schemas.openxmlformats.org/officeDocument/2006/relationships" xmlns:p="http://schemas.openxmlformats.org/presentationml/2006/main">
+  <p:cSld>
+    <p:spTree>
+      <p:nvGrpSpPr>
+        <p:cNvPr id="1" name=""/>
+        <p:cNvGrpSpPr/>
+        <p:nvPr/>
+      </p:nvGrpSpPr>
+      <p:grpSpPr>
+        <a:xfrm>
+          <a:off x="0" y="0"/>
+          <a:ext cx="0" cy="0"/>
+          <a:chOff x="0" y="0"/>
+          <a:chExt cx="0" cy="0"/>
+        </a:xfrm>
+      </p:grpSpPr>
+      <p:sp>
+        <p:nvSpPr>
+          <p:cNvPr id="2" name="Title 1"/>
+          <p:cNvSpPr>
+            <a:spLocks noGrp="1"/>
+          </p:cNvSpPr>
+          <p:nvPr>
+            <p:ph type="title"/>
+          </p:nvPr>
+        </p:nvSpPr>
+        <p:spPr/>
+        <p:txBody>
+          <a:bodyPr/>
+          <a:lstStyle/>
+          <a:p>
+            <a:r>
+              <a:rPr lang="en-US" dirty="0"/>
+              <a:t>Rules for Dheerga Swaritam</a:t>
+            </a:r>
+          </a:p>
+        </p:txBody>
+      </p:sp>
+      <p:sp>
+        <p:nvSpPr>
+          <p:cNvPr id="4" name="Content Placeholder 2"/>
+          <p:cNvSpPr>
+            <a:spLocks noGrp="1"/>
+          </p:cNvSpPr>
+          <p:nvPr>
+            <p:ph idx="1"/>
+          </p:nvPr>
+        </p:nvSpPr>
+        <p:spPr>
+          <a:xfrm>
+            <a:off x="1040523" y="2254468"/>
+            <a:ext cx="10578663" cy="4603532"/>
+          </a:xfrm>
+        </p:spPr>
+        <p:txBody>
+          <a:bodyPr>
+            <a:normAutofit lnSpcReduction="10000"/>
+          </a:bodyPr>
+          <a:lstStyle/>
+          <a:p>
+            <a:pPr lvl="1"/>
+            <a:r>
+              <a:rPr lang="en-US" sz="2600" b="1" dirty="0">
+                <a:latin typeface="Arial" panose="020B0604020202020204" pitchFamily="34" charset="0"/>
+                <a:cs typeface="Arial" panose="020B0604020202020204" pitchFamily="34" charset="0"/>
+              </a:rPr>
+              <a:t>Four main rules (can be condensed as three)</a:t>
+            </a:r>
+          </a:p>
+          <a:p>
+            <a:pPr lvl="1"/>
+            <a:r>
+              <a:rPr lang="en-US" sz="2600" b="1" dirty="0">
+                <a:latin typeface="Arial" panose="020B0604020202020204" pitchFamily="34" charset="0"/>
+                <a:cs typeface="Arial" panose="020B0604020202020204" pitchFamily="34" charset="0"/>
+              </a:rPr>
+              <a:t>Long letter with Swaritam followed by Conjunct Consonant</a:t>
+            </a:r>
+          </a:p>
+          <a:p>
+            <a:pPr lvl="2"/>
+            <a:r>
+              <a:rPr lang="en-US" sz="2400" b="1" dirty="0" err="1">
+                <a:latin typeface="Arial" panose="020B0604020202020204" pitchFamily="34" charset="0"/>
+                <a:cs typeface="Arial" panose="020B0604020202020204" pitchFamily="34" charset="0"/>
+              </a:rPr>
+              <a:t>gaNAnA$nthvA</a:t>
+            </a:r>
+            <a:r>
+              <a:rPr lang="en-US" sz="2400" b="1" dirty="0">
+                <a:latin typeface="Arial" panose="020B0604020202020204" pitchFamily="34" charset="0"/>
+                <a:cs typeface="Arial" panose="020B0604020202020204" pitchFamily="34" charset="0"/>
+              </a:rPr>
+              <a:t> , </a:t>
+            </a:r>
+            <a:r>
+              <a:rPr lang="en-US" sz="2400" b="1" dirty="0" err="1">
+                <a:latin typeface="Arial" panose="020B0604020202020204" pitchFamily="34" charset="0"/>
+                <a:cs typeface="Arial" panose="020B0604020202020204" pitchFamily="34" charset="0"/>
+              </a:rPr>
+              <a:t>senA$Bya</a:t>
+            </a:r>
+            <a:r>
+              <a:rPr lang="en-US" sz="2400" b="1" dirty="0">
+                <a:latin typeface="Arial" panose="020B0604020202020204" pitchFamily="34" charset="0"/>
+                <a:cs typeface="Arial" panose="020B0604020202020204" pitchFamily="34" charset="0"/>
+              </a:rPr>
+              <a:t>, </a:t>
+            </a:r>
+          </a:p>
+          <a:p>
+            <a:pPr lvl="2"/>
+            <a:r>
+              <a:rPr lang="en-US" sz="2400" b="1" dirty="0">
+                <a:latin typeface="Arial" panose="020B0604020202020204" pitchFamily="34" charset="0"/>
+                <a:cs typeface="Arial" panose="020B0604020202020204" pitchFamily="34" charset="0"/>
+              </a:rPr>
+              <a:t>Conjunct Consonant like </a:t>
+            </a:r>
+            <a:r>
+              <a:rPr lang="en-US" sz="2400" b="1" dirty="0" err="1">
+                <a:latin typeface="Arial" panose="020B0604020202020204" pitchFamily="34" charset="0"/>
+                <a:cs typeface="Arial" panose="020B0604020202020204" pitchFamily="34" charset="0"/>
+              </a:rPr>
+              <a:t>kSha</a:t>
+            </a:r>
+            <a:endParaRPr lang="en-US" sz="2400" b="1" dirty="0">
+              <a:latin typeface="Arial" panose="020B0604020202020204" pitchFamily="34" charset="0"/>
+              <a:cs typeface="Arial" panose="020B0604020202020204" pitchFamily="34" charset="0"/>
+            </a:endParaRPr>
+          </a:p>
+          <a:p>
+            <a:pPr lvl="2"/>
+            <a:r>
+              <a:rPr lang="en-US" sz="2400" b="1" dirty="0">
+                <a:latin typeface="Arial" panose="020B0604020202020204" pitchFamily="34" charset="0"/>
+                <a:cs typeface="Arial" panose="020B0604020202020204" pitchFamily="34" charset="0"/>
+              </a:rPr>
+              <a:t>Long letter with Visargam</a:t>
+            </a:r>
+          </a:p>
+          <a:p>
+            <a:pPr lvl="2"/>
+            <a:r>
+              <a:rPr lang="en-US" sz="2400" b="1" dirty="0">
+                <a:latin typeface="Arial" panose="020B0604020202020204" pitchFamily="34" charset="0"/>
+                <a:cs typeface="Arial" panose="020B0604020202020204" pitchFamily="34" charset="0"/>
+              </a:rPr>
+              <a:t>Not to consider Swarayukta aksharas or normal consonants</a:t>
+            </a:r>
+          </a:p>
+          <a:p>
+            <a:pPr lvl="2"/>
+            <a:r>
+              <a:rPr lang="en-US" sz="2400" b="1" dirty="0">
+                <a:latin typeface="Arial" panose="020B0604020202020204" pitchFamily="34" charset="0"/>
+                <a:cs typeface="Arial" panose="020B0604020202020204" pitchFamily="34" charset="0"/>
+              </a:rPr>
+              <a:t>If normal consonant forms after the long letter, it will be treated as Swaritam</a:t>
+            </a:r>
+          </a:p>
+          <a:p>
+            <a:pPr lvl="2"/>
+            <a:r>
+              <a:rPr lang="en-US" sz="2400" b="1" dirty="0">
+                <a:latin typeface="Arial" panose="020B0604020202020204" pitchFamily="34" charset="0"/>
+                <a:cs typeface="Arial" panose="020B0604020202020204" pitchFamily="34" charset="0"/>
+              </a:rPr>
+              <a:t> when avagraha is formed</a:t>
+            </a:r>
+            <a:br>
+              <a:rPr lang="en-US" sz="2400" b="1" dirty="0">
+                <a:latin typeface="Arial" panose="020B0604020202020204" pitchFamily="34" charset="0"/>
+                <a:cs typeface="Arial" panose="020B0604020202020204" pitchFamily="34" charset="0"/>
+              </a:rPr>
+            </a:br>
+            <a:endParaRPr lang="en-US" sz="2400" b="1" dirty="0">
+              <a:latin typeface="Arial" panose="020B0604020202020204" pitchFamily="34" charset="0"/>
+              <a:cs typeface="Arial" panose="020B0604020202020204" pitchFamily="34" charset="0"/>
+            </a:endParaRPr>
+          </a:p>
+        </p:txBody>
+      </p:sp>
+    </p:spTree>
+    <p:extLst>
+      <p:ext uri="{BB962C8B-B14F-4D97-AF65-F5344CB8AC3E}">
+        <p14:creationId xmlns:p14="http://schemas.microsoft.com/office/powerpoint/2010/main" val="3124571522"/>
+      </p:ext>
+    </p:extLst>
+  </p:cSld>
+  <p:clrMapOvr>
+    <a:masterClrMapping/>
+  </p:clrMapOvr>
+</p:sld>
+</file>
+
+<file path=ppt/slides/slide4.xml><?xml version="1.0" encoding="utf-8"?>
+<p:sld xmlns:a="http://schemas.openxmlformats.org/drawingml/2006/main" xmlns:r="http://schemas.openxmlformats.org/officeDocument/2006/relationships" xmlns:p="http://schemas.openxmlformats.org/presentationml/2006/main">
+  <p:cSld>
+    <p:spTree>
+      <p:nvGrpSpPr>
+        <p:cNvPr id="1" name=""/>
+        <p:cNvGrpSpPr/>
+        <p:nvPr/>
+      </p:nvGrpSpPr>
+      <p:grpSpPr>
+        <a:xfrm>
+          <a:off x="0" y="0"/>
+          <a:ext cx="0" cy="0"/>
+          <a:chOff x="0" y="0"/>
+          <a:chExt cx="0" cy="0"/>
+        </a:xfrm>
+      </p:grpSpPr>
+      <p:sp>
+        <p:nvSpPr>
+          <p:cNvPr id="2" name="Title 1">
+            <a:extLst>
+              <a:ext uri="{FF2B5EF4-FFF2-40B4-BE49-F238E27FC236}">
+                <a16:creationId xmlns:a16="http://schemas.microsoft.com/office/drawing/2014/main" id="{517B5AE0-9946-465D-BD5F-200EA68D0E27}"/>
+              </a:ext>
+            </a:extLst>
+          </p:cNvPr>
+          <p:cNvSpPr>
+            <a:spLocks noGrp="1"/>
+          </p:cNvSpPr>
+          <p:nvPr>
+            <p:ph type="title"/>
+          </p:nvPr>
+        </p:nvSpPr>
+        <p:spPr/>
+        <p:txBody>
+          <a:bodyPr/>
+          <a:lstStyle/>
+          <a:p>
+            <a:r>
+              <a:rPr lang="en-US" dirty="0"/>
+              <a:t>Exception Rules</a:t>
+            </a:r>
+            <a:endParaRPr lang="en-IN" dirty="0"/>
+          </a:p>
+        </p:txBody>
+      </p:sp>
+      <p:sp>
+        <p:nvSpPr>
+          <p:cNvPr id="3" name="Content Placeholder 2">
+            <a:extLst>
+              <a:ext uri="{FF2B5EF4-FFF2-40B4-BE49-F238E27FC236}">
+                <a16:creationId xmlns:a16="http://schemas.microsoft.com/office/drawing/2014/main" id="{FA578BC3-DABB-4A3F-A6D7-C6C35681F8A1}"/>
+              </a:ext>
+            </a:extLst>
+          </p:cNvPr>
+          <p:cNvSpPr>
+            <a:spLocks noGrp="1"/>
+          </p:cNvSpPr>
+          <p:nvPr>
+            <p:ph idx="1"/>
+          </p:nvPr>
+        </p:nvSpPr>
+        <p:spPr>
+          <a:xfrm>
+            <a:off x="914400" y="2380593"/>
+            <a:ext cx="9632731" cy="4272455"/>
+          </a:xfrm>
+        </p:spPr>
+        <p:txBody>
+          <a:bodyPr>
+            <a:normAutofit/>
+          </a:bodyPr>
+          <a:lstStyle/>
+          <a:p>
+            <a:r>
+              <a:rPr lang="en-US" sz="2800" b="1" dirty="0">
+                <a:latin typeface="Arial" panose="020B0604020202020204" pitchFamily="34" charset="0"/>
+                <a:cs typeface="Arial" panose="020B0604020202020204" pitchFamily="34" charset="0"/>
+              </a:rPr>
+              <a:t>“OM” is an exception with example</a:t>
+            </a:r>
+          </a:p>
+          <a:p>
+            <a:r>
+              <a:rPr lang="en-US" sz="2800" b="1" dirty="0" err="1">
+                <a:latin typeface="Arial" panose="020B0604020202020204" pitchFamily="34" charset="0"/>
+                <a:cs typeface="Arial" panose="020B0604020202020204" pitchFamily="34" charset="0"/>
+              </a:rPr>
+              <a:t>Swarabakthi</a:t>
+            </a:r>
+            <a:r>
+              <a:rPr lang="en-US" sz="2800" b="1" dirty="0">
+                <a:latin typeface="Arial" panose="020B0604020202020204" pitchFamily="34" charset="0"/>
+                <a:cs typeface="Arial" panose="020B0604020202020204" pitchFamily="34" charset="0"/>
+              </a:rPr>
+              <a:t> </a:t>
+            </a:r>
+          </a:p>
+          <a:p>
+            <a:pPr lvl="1"/>
+            <a:r>
+              <a:rPr lang="en-US" sz="2600" b="1" dirty="0" err="1">
+                <a:latin typeface="Arial" panose="020B0604020202020204" pitchFamily="34" charset="0"/>
+                <a:cs typeface="Arial" panose="020B0604020202020204" pitchFamily="34" charset="0"/>
+              </a:rPr>
+              <a:t>Swarabakthi</a:t>
+            </a:r>
+            <a:r>
+              <a:rPr lang="en-US" sz="2600" b="1" dirty="0">
+                <a:latin typeface="Arial" panose="020B0604020202020204" pitchFamily="34" charset="0"/>
+                <a:cs typeface="Arial" panose="020B0604020202020204" pitchFamily="34" charset="0"/>
+              </a:rPr>
+              <a:t> not considered by some schools</a:t>
+            </a:r>
+          </a:p>
+          <a:p>
+            <a:pPr lvl="1"/>
+            <a:r>
+              <a:rPr lang="en-US" sz="2600" b="1" dirty="0" err="1">
+                <a:latin typeface="Arial" panose="020B0604020202020204" pitchFamily="34" charset="0"/>
+                <a:cs typeface="Arial" panose="020B0604020202020204" pitchFamily="34" charset="0"/>
+              </a:rPr>
+              <a:t>Sahasra</a:t>
+            </a:r>
+            <a:r>
+              <a:rPr lang="en-US" sz="2600" b="1" dirty="0">
+                <a:latin typeface="Arial" panose="020B0604020202020204" pitchFamily="34" charset="0"/>
+                <a:cs typeface="Arial" panose="020B0604020202020204" pitchFamily="34" charset="0"/>
+              </a:rPr>
+              <a:t> </a:t>
+            </a:r>
+            <a:r>
+              <a:rPr lang="en-US" sz="2600" b="1" dirty="0" err="1">
+                <a:latin typeface="Arial" panose="020B0604020202020204" pitchFamily="34" charset="0"/>
+                <a:cs typeface="Arial" panose="020B0604020202020204" pitchFamily="34" charset="0"/>
+              </a:rPr>
+              <a:t>Sir.ShaNya</a:t>
+            </a:r>
+            <a:r>
+              <a:rPr lang="en-US" sz="2600" b="1" dirty="0">
+                <a:latin typeface="Arial" panose="020B0604020202020204" pitchFamily="34" charset="0"/>
+                <a:cs typeface="Arial" panose="020B0604020202020204" pitchFamily="34" charset="0"/>
+              </a:rPr>
+              <a:t> </a:t>
+            </a:r>
+            <a:r>
+              <a:rPr lang="en-US" sz="2600" b="1" dirty="0" err="1">
+                <a:latin typeface="Arial" panose="020B0604020202020204" pitchFamily="34" charset="0"/>
+                <a:cs typeface="Arial" panose="020B0604020202020204" pitchFamily="34" charset="0"/>
+              </a:rPr>
+              <a:t>prANAH</a:t>
+            </a:r>
+            <a:endParaRPr lang="en-US" sz="2600" b="1" dirty="0">
+              <a:latin typeface="Arial" panose="020B0604020202020204" pitchFamily="34" charset="0"/>
+              <a:cs typeface="Arial" panose="020B0604020202020204" pitchFamily="34" charset="0"/>
+            </a:endParaRPr>
+          </a:p>
+          <a:p>
+            <a:r>
+              <a:rPr lang="en-US" sz="2800" b="1" dirty="0">
+                <a:latin typeface="Arial" panose="020B0604020202020204" pitchFamily="34" charset="0"/>
+                <a:cs typeface="Arial" panose="020B0604020202020204" pitchFamily="34" charset="0"/>
+              </a:rPr>
+              <a:t>Effect of Short letter ending with ‘n’ followed by th</a:t>
+            </a:r>
+          </a:p>
+          <a:p>
+            <a:pPr lvl="1"/>
+            <a:r>
+              <a:rPr lang="en-US" sz="2600" b="1" dirty="0" err="1">
+                <a:latin typeface="Arial" panose="020B0604020202020204" pitchFamily="34" charset="0"/>
+                <a:cs typeface="Arial" panose="020B0604020202020204" pitchFamily="34" charset="0"/>
+              </a:rPr>
+              <a:t>Tasmi$nth</a:t>
+            </a:r>
+            <a:r>
+              <a:rPr lang="en-US" sz="2600" b="1" dirty="0">
+                <a:latin typeface="Arial" panose="020B0604020202020204" pitchFamily="34" charset="0"/>
+                <a:cs typeface="Arial" panose="020B0604020202020204" pitchFamily="34" charset="0"/>
+              </a:rPr>
+              <a:t> sarvam pratiShTitam </a:t>
+            </a:r>
+          </a:p>
+          <a:p>
+            <a:r>
+              <a:rPr lang="en-US" sz="2800" b="1" dirty="0">
+                <a:latin typeface="Arial" panose="020B0604020202020204" pitchFamily="34" charset="0"/>
+                <a:cs typeface="Arial" panose="020B0604020202020204" pitchFamily="34" charset="0"/>
+              </a:rPr>
+              <a:t>Effect of Short anusvAram when followed by pause </a:t>
+            </a:r>
+            <a:r>
+              <a:rPr lang="en-US" sz="2800" b="1" dirty="0" err="1">
+                <a:latin typeface="Arial" panose="020B0604020202020204" pitchFamily="34" charset="0"/>
+                <a:cs typeface="Arial" panose="020B0604020202020204" pitchFamily="34" charset="0"/>
+              </a:rPr>
+              <a:t>e.g</a:t>
+            </a:r>
+            <a:r>
+              <a:rPr lang="en-US" sz="2800" b="1" dirty="0">
+                <a:latin typeface="Arial" panose="020B0604020202020204" pitchFamily="34" charset="0"/>
+                <a:cs typeface="Arial" panose="020B0604020202020204" pitchFamily="34" charset="0"/>
+              </a:rPr>
+              <a:t> </a:t>
+            </a:r>
+            <a:r>
+              <a:rPr lang="en-US" sz="2800" b="1" dirty="0" err="1">
+                <a:latin typeface="Arial" panose="020B0604020202020204" pitchFamily="34" charset="0"/>
+                <a:cs typeface="Arial" panose="020B0604020202020204" pitchFamily="34" charset="0"/>
+              </a:rPr>
+              <a:t>saM.j~janam</a:t>
+            </a:r>
+            <a:endParaRPr lang="en-US" sz="2800" b="1" dirty="0">
+              <a:latin typeface="Arial" panose="020B0604020202020204" pitchFamily="34" charset="0"/>
+              <a:cs typeface="Arial" panose="020B0604020202020204" pitchFamily="34" charset="0"/>
+            </a:endParaRPr>
+          </a:p>
+          <a:p>
+            <a:endParaRPr lang="en-IN" sz="2800" b="1" dirty="0">
+              <a:latin typeface="Arial" panose="020B0604020202020204" pitchFamily="34" charset="0"/>
+              <a:cs typeface="Arial" panose="020B0604020202020204" pitchFamily="34" charset="0"/>
+            </a:endParaRPr>
+          </a:p>
+        </p:txBody>
+      </p:sp>
+    </p:spTree>
+    <p:extLst>
+      <p:ext uri="{BB962C8B-B14F-4D97-AF65-F5344CB8AC3E}">
+        <p14:creationId xmlns:p14="http://schemas.microsoft.com/office/powerpoint/2010/main" val="2982091870"/>
+      </p:ext>
+    </p:extLst>
+  </p:cSld>
+  <p:clrMapOvr>
+    <a:masterClrMapping/>
+  </p:clrMapOvr>
+</p:sld>
+</file>
+
+<file path=ppt/slides/slide5.xml><?xml version="1.0" encoding="utf-8"?>
+<p:sld xmlns:a="http://schemas.openxmlformats.org/drawingml/2006/main" xmlns:r="http://schemas.openxmlformats.org/officeDocument/2006/relationships" xmlns:p="http://schemas.openxmlformats.org/presentationml/2006/main">
+  <p:cSld>
+    <p:spTree>
+      <p:nvGrpSpPr>
+        <p:cNvPr id="1" name=""/>
+        <p:cNvGrpSpPr/>
+        <p:nvPr/>
+      </p:nvGrpSpPr>
+      <p:grpSpPr>
+        <a:xfrm>
+          <a:off x="0" y="0"/>
+          <a:ext cx="0" cy="0"/>
+          <a:chOff x="0" y="0"/>
+          <a:chExt cx="0" cy="0"/>
+        </a:xfrm>
+      </p:grpSpPr>
+      <p:sp>
+        <p:nvSpPr>
+          <p:cNvPr id="2" name="Title 1">
+            <a:extLst>
+              <a:ext uri="{FF2B5EF4-FFF2-40B4-BE49-F238E27FC236}">
+                <a16:creationId xmlns:a16="http://schemas.microsoft.com/office/drawing/2014/main" id="{517B5AE0-9946-465D-BD5F-200EA68D0E27}"/>
+              </a:ext>
+            </a:extLst>
+          </p:cNvPr>
+          <p:cNvSpPr>
+            <a:spLocks noGrp="1"/>
+          </p:cNvSpPr>
+          <p:nvPr>
+            <p:ph type="title"/>
+          </p:nvPr>
+        </p:nvSpPr>
+        <p:spPr/>
+        <p:txBody>
+          <a:bodyPr/>
+          <a:lstStyle/>
+          <a:p>
+            <a:r>
+              <a:rPr lang="en-US" dirty="0"/>
+              <a:t>Dheerga Letter at the end of a Ruk</a:t>
+            </a:r>
+            <a:endParaRPr lang="en-IN" dirty="0"/>
+          </a:p>
+        </p:txBody>
+      </p:sp>
+      <p:sp>
+        <p:nvSpPr>
+          <p:cNvPr id="3" name="Content Placeholder 2">
+            <a:extLst>
+              <a:ext uri="{FF2B5EF4-FFF2-40B4-BE49-F238E27FC236}">
+                <a16:creationId xmlns:a16="http://schemas.microsoft.com/office/drawing/2014/main" id="{FA578BC3-DABB-4A3F-A6D7-C6C35681F8A1}"/>
+              </a:ext>
+            </a:extLst>
+          </p:cNvPr>
+          <p:cNvSpPr>
+            <a:spLocks noGrp="1"/>
+          </p:cNvSpPr>
+          <p:nvPr>
+            <p:ph idx="1"/>
+          </p:nvPr>
+        </p:nvSpPr>
+        <p:spPr>
+          <a:xfrm>
+            <a:off x="914400" y="2380593"/>
+            <a:ext cx="9066213" cy="3639207"/>
+          </a:xfrm>
+        </p:spPr>
+        <p:txBody>
+          <a:bodyPr>
+            <a:normAutofit/>
+          </a:bodyPr>
+          <a:lstStyle/>
+          <a:p>
+            <a:r>
+              <a:rPr lang="en-US" sz="2800" b="1" dirty="0">
+                <a:latin typeface="Arial" panose="020B0604020202020204" pitchFamily="34" charset="0"/>
+                <a:cs typeface="Arial" panose="020B0604020202020204" pitchFamily="34" charset="0"/>
+              </a:rPr>
+              <a:t>A long letter with Swaritam at the end of the Vedic Statement</a:t>
+            </a:r>
+          </a:p>
+          <a:p>
+            <a:pPr lvl="1"/>
+            <a:r>
+              <a:rPr lang="en-US" sz="2600" b="1" dirty="0">
+                <a:latin typeface="Arial" panose="020B0604020202020204" pitchFamily="34" charset="0"/>
+                <a:cs typeface="Arial" panose="020B0604020202020204" pitchFamily="34" charset="0"/>
+              </a:rPr>
+              <a:t>mi/</a:t>
+            </a:r>
+            <a:r>
+              <a:rPr lang="en-US" sz="2600" b="1" dirty="0" err="1">
+                <a:latin typeface="Arial" panose="020B0604020202020204" pitchFamily="34" charset="0"/>
+                <a:cs typeface="Arial" panose="020B0604020202020204" pitchFamily="34" charset="0"/>
+              </a:rPr>
+              <a:t>DhuShe</a:t>
+            </a:r>
+            <a:r>
+              <a:rPr lang="en-US" sz="2600" b="1" dirty="0">
+                <a:latin typeface="Arial" panose="020B0604020202020204" pitchFamily="34" charset="0"/>
+                <a:cs typeface="Arial" panose="020B0604020202020204" pitchFamily="34" charset="0"/>
+              </a:rPr>
+              <a:t>$, ava </a:t>
+            </a:r>
+            <a:r>
+              <a:rPr lang="en-US" sz="2600" b="1" dirty="0" err="1">
+                <a:latin typeface="Arial" panose="020B0604020202020204" pitchFamily="34" charset="0"/>
+                <a:cs typeface="Arial" panose="020B0604020202020204" pitchFamily="34" charset="0"/>
+              </a:rPr>
+              <a:t>purastA$t</a:t>
+            </a:r>
+            <a:r>
+              <a:rPr lang="en-US" sz="2600" b="1" dirty="0">
+                <a:latin typeface="Arial" panose="020B0604020202020204" pitchFamily="34" charset="0"/>
+                <a:cs typeface="Arial" panose="020B0604020202020204" pitchFamily="34" charset="0"/>
+              </a:rPr>
+              <a:t>, </a:t>
+            </a:r>
+            <a:r>
+              <a:rPr lang="en-US" sz="2600" b="1" dirty="0" err="1">
+                <a:latin typeface="Arial" panose="020B0604020202020204" pitchFamily="34" charset="0"/>
+                <a:cs typeface="Arial" panose="020B0604020202020204" pitchFamily="34" charset="0"/>
+              </a:rPr>
+              <a:t>SvAhA</a:t>
+            </a:r>
+            <a:r>
+              <a:rPr lang="en-US" sz="2600" b="1" dirty="0">
+                <a:latin typeface="Arial" panose="020B0604020202020204" pitchFamily="34" charset="0"/>
+                <a:cs typeface="Arial" panose="020B0604020202020204" pitchFamily="34" charset="0"/>
+              </a:rPr>
+              <a:t>$</a:t>
+            </a:r>
+            <a:endParaRPr lang="en-IN" sz="2600" b="1" dirty="0">
+              <a:latin typeface="Arial" panose="020B0604020202020204" pitchFamily="34" charset="0"/>
+              <a:cs typeface="Arial" panose="020B0604020202020204" pitchFamily="34" charset="0"/>
+            </a:endParaRPr>
+          </a:p>
+        </p:txBody>
+      </p:sp>
+    </p:spTree>
+    <p:extLst>
+      <p:ext uri="{BB962C8B-B14F-4D97-AF65-F5344CB8AC3E}">
+        <p14:creationId xmlns:p14="http://schemas.microsoft.com/office/powerpoint/2010/main" val="2269296812"/>
+      </p:ext>
+    </p:extLst>
+  </p:cSld>
+  <p:clrMapOvr>
+    <a:masterClrMapping/>
+  </p:clrMapOvr>
+</p:sld>
+</file>
+
+<file path=ppt/slides/slide6.xml><?xml version="1.0" encoding="utf-8"?>
+<p:sld xmlns:a="http://schemas.openxmlformats.org/drawingml/2006/main" xmlns:r="http://schemas.openxmlformats.org/officeDocument/2006/relationships" xmlns:p="http://schemas.openxmlformats.org/presentationml/2006/main">
+  <p:cSld>
+    <p:spTree>
+      <p:nvGrpSpPr>
+        <p:cNvPr id="1" name=""/>
+        <p:cNvGrpSpPr/>
+        <p:nvPr/>
+      </p:nvGrpSpPr>
+      <p:grpSpPr>
+        <a:xfrm>
+          <a:off x="0" y="0"/>
+          <a:ext cx="0" cy="0"/>
+          <a:chOff x="0" y="0"/>
+          <a:chExt cx="0" cy="0"/>
+        </a:xfrm>
+      </p:grpSpPr>
+      <p:sp>
+        <p:nvSpPr>
+          <p:cNvPr id="2" name="Title 1">
+            <a:extLst>
+              <a:ext uri="{FF2B5EF4-FFF2-40B4-BE49-F238E27FC236}">
+                <a16:creationId xmlns:a16="http://schemas.microsoft.com/office/drawing/2014/main" id="{517B5AE0-9946-465D-BD5F-200EA68D0E27}"/>
+              </a:ext>
+            </a:extLst>
+          </p:cNvPr>
+          <p:cNvSpPr>
+            <a:spLocks noGrp="1"/>
+          </p:cNvSpPr>
+          <p:nvPr>
+            <p:ph type="title"/>
+          </p:nvPr>
+        </p:nvSpPr>
+        <p:spPr/>
+        <p:txBody>
+          <a:bodyPr/>
+          <a:lstStyle/>
+          <a:p>
+            <a:r>
+              <a:rPr lang="en-US" dirty="0"/>
+              <a:t>anusvAram at the end of a Ruk</a:t>
+            </a:r>
+            <a:endParaRPr lang="en-IN" dirty="0"/>
+          </a:p>
+        </p:txBody>
+      </p:sp>
+      <p:sp>
+        <p:nvSpPr>
+          <p:cNvPr id="3" name="Content Placeholder 2">
+            <a:extLst>
+              <a:ext uri="{FF2B5EF4-FFF2-40B4-BE49-F238E27FC236}">
+                <a16:creationId xmlns:a16="http://schemas.microsoft.com/office/drawing/2014/main" id="{FA578BC3-DABB-4A3F-A6D7-C6C35681F8A1}"/>
+              </a:ext>
+            </a:extLst>
+          </p:cNvPr>
+          <p:cNvSpPr>
+            <a:spLocks noGrp="1"/>
+          </p:cNvSpPr>
+          <p:nvPr>
+            <p:ph idx="1"/>
+          </p:nvPr>
+        </p:nvSpPr>
+        <p:spPr>
+          <a:xfrm>
+            <a:off x="914400" y="2380593"/>
+            <a:ext cx="9238593" cy="3909848"/>
+          </a:xfrm>
+        </p:spPr>
+        <p:txBody>
+          <a:bodyPr>
+            <a:normAutofit/>
+          </a:bodyPr>
+          <a:lstStyle/>
+          <a:p>
+            <a:r>
+              <a:rPr lang="en-US" sz="2800" b="1" dirty="0">
+                <a:latin typeface="Arial" panose="020B0604020202020204" pitchFamily="34" charset="0"/>
+                <a:cs typeface="Arial" panose="020B0604020202020204" pitchFamily="34" charset="0"/>
+              </a:rPr>
+              <a:t>An anusvAram at the end Vedic Statement whether long or short</a:t>
+            </a:r>
+          </a:p>
+          <a:p>
+            <a:pPr lvl="1"/>
+            <a:r>
+              <a:rPr lang="en-US" sz="2600" b="1" dirty="0">
+                <a:latin typeface="Arial" panose="020B0604020202020204" pitchFamily="34" charset="0"/>
+                <a:cs typeface="Arial" panose="020B0604020202020204" pitchFamily="34" charset="0"/>
+              </a:rPr>
+              <a:t>ava </a:t>
+            </a:r>
+            <a:r>
+              <a:rPr lang="en-US" sz="2600" b="1" dirty="0" err="1">
+                <a:latin typeface="Arial" panose="020B0604020202020204" pitchFamily="34" charset="0"/>
+                <a:cs typeface="Arial" panose="020B0604020202020204" pitchFamily="34" charset="0"/>
+              </a:rPr>
+              <a:t>SrotAra$m</a:t>
+            </a:r>
+            <a:r>
+              <a:rPr lang="en-US" sz="2600" b="1" dirty="0">
+                <a:latin typeface="Arial" panose="020B0604020202020204" pitchFamily="34" charset="0"/>
+                <a:cs typeface="Arial" panose="020B0604020202020204" pitchFamily="34" charset="0"/>
+              </a:rPr>
+              <a:t>, </a:t>
+            </a:r>
+            <a:r>
+              <a:rPr lang="en-US" sz="2600" b="1" dirty="0" err="1">
+                <a:latin typeface="Arial" panose="020B0604020202020204" pitchFamily="34" charset="0"/>
+                <a:cs typeface="Arial" panose="020B0604020202020204" pitchFamily="34" charset="0"/>
+              </a:rPr>
+              <a:t>niShTyA$m</a:t>
+            </a:r>
+            <a:r>
+              <a:rPr lang="en-US" sz="2600" b="1" dirty="0">
+                <a:latin typeface="Arial" panose="020B0604020202020204" pitchFamily="34" charset="0"/>
+                <a:cs typeface="Arial" panose="020B0604020202020204" pitchFamily="34" charset="0"/>
+              </a:rPr>
+              <a:t>, </a:t>
+            </a:r>
+            <a:r>
+              <a:rPr lang="en-US" sz="2600" b="1" dirty="0" err="1">
+                <a:latin typeface="Arial" panose="020B0604020202020204" pitchFamily="34" charset="0"/>
+                <a:cs typeface="Arial" panose="020B0604020202020204" pitchFamily="34" charset="0"/>
+              </a:rPr>
+              <a:t>panthA$m</a:t>
+            </a:r>
+            <a:r>
+              <a:rPr lang="en-US" sz="2600" b="1" dirty="0">
+                <a:latin typeface="Arial" panose="020B0604020202020204" pitchFamily="34" charset="0"/>
+                <a:cs typeface="Arial" panose="020B0604020202020204" pitchFamily="34" charset="0"/>
+              </a:rPr>
+              <a:t>, </a:t>
+            </a:r>
+            <a:r>
+              <a:rPr lang="en-US" sz="2600" b="1" dirty="0" err="1">
+                <a:latin typeface="Arial" panose="020B0604020202020204" pitchFamily="34" charset="0"/>
+                <a:cs typeface="Arial" panose="020B0604020202020204" pitchFamily="34" charset="0"/>
+              </a:rPr>
+              <a:t>vAjAna</a:t>
+            </a:r>
+            <a:r>
+              <a:rPr lang="en-US" sz="2600" b="1" dirty="0">
+                <a:latin typeface="Arial" panose="020B0604020202020204" pitchFamily="34" charset="0"/>
+                <a:cs typeface="Arial" panose="020B0604020202020204" pitchFamily="34" charset="0"/>
+              </a:rPr>
+              <a:t>(gm) </a:t>
+            </a:r>
+            <a:r>
+              <a:rPr lang="en-US" sz="2600" b="1" dirty="0" err="1">
+                <a:latin typeface="Arial" panose="020B0604020202020204" pitchFamily="34" charset="0"/>
+                <a:cs typeface="Arial" panose="020B0604020202020204" pitchFamily="34" charset="0"/>
+              </a:rPr>
+              <a:t>satpatim</a:t>
+            </a:r>
+            <a:r>
+              <a:rPr lang="en-US" sz="2600" b="1" dirty="0">
+                <a:latin typeface="Arial" panose="020B0604020202020204" pitchFamily="34" charset="0"/>
+                <a:cs typeface="Arial" panose="020B0604020202020204" pitchFamily="34" charset="0"/>
+              </a:rPr>
+              <a:t> </a:t>
+            </a:r>
+            <a:r>
+              <a:rPr lang="en-US" sz="2600" b="1" dirty="0" err="1">
+                <a:latin typeface="Arial" panose="020B0604020202020204" pitchFamily="34" charset="0"/>
+                <a:cs typeface="Arial" panose="020B0604020202020204" pitchFamily="34" charset="0"/>
+              </a:rPr>
+              <a:t>pati$m</a:t>
+            </a:r>
+            <a:endParaRPr lang="en-US" sz="2600" b="1" dirty="0">
+              <a:latin typeface="Arial" panose="020B0604020202020204" pitchFamily="34" charset="0"/>
+              <a:cs typeface="Arial" panose="020B0604020202020204" pitchFamily="34" charset="0"/>
+            </a:endParaRPr>
+          </a:p>
+          <a:p>
+            <a:pPr lvl="1"/>
+            <a:endParaRPr lang="en-US" sz="2600" b="1" dirty="0">
+              <a:latin typeface="Arial" panose="020B0604020202020204" pitchFamily="34" charset="0"/>
+              <a:cs typeface="Arial" panose="020B0604020202020204" pitchFamily="34" charset="0"/>
+            </a:endParaRPr>
+          </a:p>
+        </p:txBody>
+      </p:sp>
+    </p:spTree>
+    <p:extLst>
+      <p:ext uri="{BB962C8B-B14F-4D97-AF65-F5344CB8AC3E}">
+        <p14:creationId xmlns:p14="http://schemas.microsoft.com/office/powerpoint/2010/main" val="3339025661"/>
+      </p:ext>
+    </p:extLst>
+  </p:cSld>
+  <p:clrMapOvr>
+    <a:masterClrMapping/>
+  </p:clrMapOvr>
+</p:sld>
+</file>
+
+<file path=ppt/slides/slide7.xml><?xml version="1.0" encoding="utf-8"?>
+<p:sld xmlns:a="http://schemas.openxmlformats.org/drawingml/2006/main" xmlns:r="http://schemas.openxmlformats.org/officeDocument/2006/relationships" xmlns:p="http://schemas.openxmlformats.org/presentationml/2006/main">
+  <p:cSld>
+    <p:spTree>
+      <p:nvGrpSpPr>
+        <p:cNvPr id="1" name=""/>
+        <p:cNvGrpSpPr/>
+        <p:nvPr/>
+      </p:nvGrpSpPr>
+      <p:grpSpPr>
+        <a:xfrm>
+          <a:off x="0" y="0"/>
+          <a:ext cx="0" cy="0"/>
+          <a:chOff x="0" y="0"/>
+          <a:chExt cx="0" cy="0"/>
+        </a:xfrm>
+      </p:grpSpPr>
+      <p:sp>
+        <p:nvSpPr>
+          <p:cNvPr id="2" name="Title 1">
+            <a:extLst>
+              <a:ext uri="{FF2B5EF4-FFF2-40B4-BE49-F238E27FC236}">
+                <a16:creationId xmlns:a16="http://schemas.microsoft.com/office/drawing/2014/main" id="{517B5AE0-9946-465D-BD5F-200EA68D0E27}"/>
+              </a:ext>
+            </a:extLst>
+          </p:cNvPr>
+          <p:cNvSpPr>
+            <a:spLocks noGrp="1"/>
+          </p:cNvSpPr>
+          <p:nvPr>
+            <p:ph type="title"/>
+          </p:nvPr>
+        </p:nvSpPr>
+        <p:spPr/>
+        <p:txBody>
+          <a:bodyPr/>
+          <a:lstStyle/>
+          <a:p>
+            <a:r>
+              <a:rPr lang="en-US" dirty="0"/>
+              <a:t>Dheerga anusvAram in </a:t>
+            </a:r>
+            <a:endParaRPr lang="en-IN" dirty="0"/>
+          </a:p>
+        </p:txBody>
+      </p:sp>
+      <p:sp>
+        <p:nvSpPr>
+          <p:cNvPr id="3" name="Content Placeholder 2">
+            <a:extLst>
+              <a:ext uri="{FF2B5EF4-FFF2-40B4-BE49-F238E27FC236}">
+                <a16:creationId xmlns:a16="http://schemas.microsoft.com/office/drawing/2014/main" id="{FA578BC3-DABB-4A3F-A6D7-C6C35681F8A1}"/>
+              </a:ext>
+            </a:extLst>
+          </p:cNvPr>
+          <p:cNvSpPr>
+            <a:spLocks noGrp="1"/>
+          </p:cNvSpPr>
+          <p:nvPr>
+            <p:ph idx="1"/>
+          </p:nvPr>
+        </p:nvSpPr>
+        <p:spPr>
+          <a:xfrm>
+            <a:off x="914400" y="2380593"/>
+            <a:ext cx="9066213" cy="3639207"/>
+          </a:xfrm>
+        </p:spPr>
+        <p:txBody>
+          <a:bodyPr>
+            <a:normAutofit/>
+          </a:bodyPr>
+          <a:lstStyle/>
+          <a:p>
+            <a:r>
+              <a:rPr lang="en-US" sz="2800" b="1" dirty="0">
+                <a:latin typeface="Arial" panose="020B0604020202020204" pitchFamily="34" charset="0"/>
+                <a:cs typeface="Arial" panose="020B0604020202020204" pitchFamily="34" charset="0"/>
+              </a:rPr>
+              <a:t>A long anusvAram in the middle of the Vedic Statement</a:t>
+            </a:r>
+          </a:p>
+          <a:p>
+            <a:pPr lvl="1"/>
+            <a:r>
+              <a:rPr lang="en-US" sz="2600" b="1" dirty="0">
+                <a:latin typeface="Arial" panose="020B0604020202020204" pitchFamily="34" charset="0"/>
+                <a:cs typeface="Arial" panose="020B0604020202020204" pitchFamily="34" charset="0"/>
+              </a:rPr>
+              <a:t>yO </a:t>
+            </a:r>
+            <a:r>
+              <a:rPr lang="en-US" sz="2600" b="1" dirty="0" err="1">
+                <a:latin typeface="Arial" panose="020B0604020202020204" pitchFamily="34" charset="0"/>
+                <a:cs typeface="Arial" panose="020B0604020202020204" pitchFamily="34" charset="0"/>
+              </a:rPr>
+              <a:t>devAnA$m</a:t>
+            </a:r>
+            <a:r>
+              <a:rPr lang="en-US" sz="2600" b="1" dirty="0">
+                <a:latin typeface="Arial" panose="020B0604020202020204" pitchFamily="34" charset="0"/>
+                <a:cs typeface="Arial" panose="020B0604020202020204" pitchFamily="34" charset="0"/>
+              </a:rPr>
+              <a:t> </a:t>
+            </a:r>
+            <a:r>
+              <a:rPr lang="en-US" sz="2600" b="1" dirty="0" err="1">
+                <a:latin typeface="Arial" panose="020B0604020202020204" pitchFamily="34" charset="0"/>
+                <a:cs typeface="Arial" panose="020B0604020202020204" pitchFamily="34" charset="0"/>
+              </a:rPr>
+              <a:t>purOhitaH</a:t>
+            </a:r>
+            <a:r>
+              <a:rPr lang="en-US" sz="2600" b="1" dirty="0">
+                <a:latin typeface="Arial" panose="020B0604020202020204" pitchFamily="34" charset="0"/>
+                <a:cs typeface="Arial" panose="020B0604020202020204" pitchFamily="34" charset="0"/>
+              </a:rPr>
+              <a:t>, </a:t>
+            </a:r>
+            <a:br>
+              <a:rPr lang="en-US" sz="2600" b="1" dirty="0">
+                <a:latin typeface="Arial" panose="020B0604020202020204" pitchFamily="34" charset="0"/>
+                <a:cs typeface="Arial" panose="020B0604020202020204" pitchFamily="34" charset="0"/>
+              </a:rPr>
+            </a:br>
+            <a:r>
+              <a:rPr lang="en-US" sz="2600" b="1" dirty="0" err="1">
+                <a:latin typeface="Arial" panose="020B0604020202020204" pitchFamily="34" charset="0"/>
+                <a:cs typeface="Arial" panose="020B0604020202020204" pitchFamily="34" charset="0"/>
+              </a:rPr>
+              <a:t>SuShruSheNyA$M</a:t>
+            </a:r>
+            <a:r>
+              <a:rPr lang="en-US" sz="2600" b="1" dirty="0">
+                <a:latin typeface="Arial" panose="020B0604020202020204" pitchFamily="34" charset="0"/>
+                <a:cs typeface="Arial" panose="020B0604020202020204" pitchFamily="34" charset="0"/>
+              </a:rPr>
+              <a:t> </a:t>
+            </a:r>
+            <a:r>
+              <a:rPr lang="en-US" sz="2600" b="1" dirty="0" err="1">
+                <a:latin typeface="Arial" panose="020B0604020202020204" pitchFamily="34" charset="0"/>
+                <a:cs typeface="Arial" panose="020B0604020202020204" pitchFamily="34" charset="0"/>
+              </a:rPr>
+              <a:t>manusheByastam</a:t>
+            </a:r>
+            <a:endParaRPr lang="en-US" sz="2600" b="1" dirty="0">
+              <a:latin typeface="Arial" panose="020B0604020202020204" pitchFamily="34" charset="0"/>
+              <a:cs typeface="Arial" panose="020B0604020202020204" pitchFamily="34" charset="0"/>
+            </a:endParaRPr>
+          </a:p>
+          <a:p>
+            <a:pPr lvl="1"/>
+            <a:endParaRPr lang="en-US" sz="2600" b="1" dirty="0">
+              <a:latin typeface="Arial" panose="020B0604020202020204" pitchFamily="34" charset="0"/>
+              <a:cs typeface="Arial" panose="020B0604020202020204" pitchFamily="34" charset="0"/>
+            </a:endParaRPr>
+          </a:p>
+        </p:txBody>
+      </p:sp>
+    </p:spTree>
+    <p:extLst>
+      <p:ext uri="{BB962C8B-B14F-4D97-AF65-F5344CB8AC3E}">
+        <p14:creationId xmlns:p14="http://schemas.microsoft.com/office/powerpoint/2010/main" val="3717054357"/>
+      </p:ext>
+    </p:extLst>
+  </p:cSld>
+  <p:clrMapOvr>
+    <a:masterClrMapping/>
+  </p:clrMapOvr>
+</p:sld>
+</file>
+
+<file path=ppt/slides/slide8.xml><?xml version="1.0" encoding="utf-8"?>
+<p:sld xmlns:a="http://schemas.openxmlformats.org/drawingml/2006/main" xmlns:r="http://schemas.openxmlformats.org/officeDocument/2006/relationships" xmlns:p="http://schemas.openxmlformats.org/presentationml/2006/main">
+  <p:cSld>
+    <p:spTree>
+      <p:nvGrpSpPr>
+        <p:cNvPr id="1" name=""/>
+        <p:cNvGrpSpPr/>
+        <p:nvPr/>
+      </p:nvGrpSpPr>
+      <p:grpSpPr>
+        <a:xfrm>
+          <a:off x="0" y="0"/>
+          <a:ext cx="0" cy="0"/>
+          <a:chOff x="0" y="0"/>
+          <a:chExt cx="0" cy="0"/>
+        </a:xfrm>
+      </p:grpSpPr>
+      <p:sp>
+        <p:nvSpPr>
+          <p:cNvPr id="2" name="Title 1">
+            <a:extLst>
+              <a:ext uri="{FF2B5EF4-FFF2-40B4-BE49-F238E27FC236}">
+                <a16:creationId xmlns:a16="http://schemas.microsoft.com/office/drawing/2014/main" id="{517B5AE0-9946-465D-BD5F-200EA68D0E27}"/>
+              </a:ext>
+            </a:extLst>
+          </p:cNvPr>
+          <p:cNvSpPr>
+            <a:spLocks noGrp="1"/>
+          </p:cNvSpPr>
+          <p:nvPr>
+            <p:ph type="title"/>
+          </p:nvPr>
+        </p:nvSpPr>
+        <p:spPr/>
+        <p:txBody>
+          <a:bodyPr/>
+          <a:lstStyle/>
+          <a:p>
+            <a:r>
+              <a:rPr lang="en-US" dirty="0"/>
+              <a:t>Effect of Ruk Veda Mantras</a:t>
+            </a:r>
+            <a:endParaRPr lang="en-IN" dirty="0"/>
+          </a:p>
+        </p:txBody>
+      </p:sp>
+      <p:sp>
+        <p:nvSpPr>
+          <p:cNvPr id="3" name="Content Placeholder 2">
+            <a:extLst>
+              <a:ext uri="{FF2B5EF4-FFF2-40B4-BE49-F238E27FC236}">
+                <a16:creationId xmlns:a16="http://schemas.microsoft.com/office/drawing/2014/main" id="{FA578BC3-DABB-4A3F-A6D7-C6C35681F8A1}"/>
+              </a:ext>
+            </a:extLst>
+          </p:cNvPr>
+          <p:cNvSpPr>
+            <a:spLocks noGrp="1"/>
+          </p:cNvSpPr>
+          <p:nvPr>
+            <p:ph idx="1"/>
+          </p:nvPr>
+        </p:nvSpPr>
+        <p:spPr>
+          <a:xfrm>
+            <a:off x="914400" y="2380593"/>
+            <a:ext cx="9066213" cy="3639207"/>
+          </a:xfrm>
+        </p:spPr>
+        <p:txBody>
+          <a:bodyPr>
+            <a:normAutofit lnSpcReduction="10000"/>
+          </a:bodyPr>
+          <a:lstStyle/>
+          <a:p>
+            <a:r>
+              <a:rPr lang="en-US" sz="2800" b="1" dirty="0">
+                <a:latin typeface="Arial" panose="020B0604020202020204" pitchFamily="34" charset="0"/>
+                <a:cs typeface="Arial" panose="020B0604020202020204" pitchFamily="34" charset="0"/>
+              </a:rPr>
+              <a:t>Some Examples</a:t>
+            </a:r>
+          </a:p>
+          <a:p>
+            <a:pPr lvl="1"/>
+            <a:r>
+              <a:rPr lang="en-US" sz="2600" b="1" dirty="0" err="1">
+                <a:latin typeface="Arial" panose="020B0604020202020204" pitchFamily="34" charset="0"/>
+                <a:cs typeface="Arial" panose="020B0604020202020204" pitchFamily="34" charset="0"/>
+              </a:rPr>
+              <a:t>agnimI$le</a:t>
+            </a:r>
+            <a:r>
+              <a:rPr lang="en-US" sz="2600" b="1" dirty="0">
+                <a:latin typeface="Arial" panose="020B0604020202020204" pitchFamily="34" charset="0"/>
+                <a:cs typeface="Arial" panose="020B0604020202020204" pitchFamily="34" charset="0"/>
+              </a:rPr>
+              <a:t> </a:t>
+            </a:r>
+            <a:r>
+              <a:rPr lang="en-US" sz="2600" b="1" dirty="0" err="1">
+                <a:latin typeface="Arial" panose="020B0604020202020204" pitchFamily="34" charset="0"/>
+                <a:cs typeface="Arial" panose="020B0604020202020204" pitchFamily="34" charset="0"/>
+              </a:rPr>
+              <a:t>purohitam</a:t>
+            </a:r>
+            <a:endParaRPr lang="en-US" sz="2600" b="1" dirty="0">
+              <a:latin typeface="Arial" panose="020B0604020202020204" pitchFamily="34" charset="0"/>
+              <a:cs typeface="Arial" panose="020B0604020202020204" pitchFamily="34" charset="0"/>
+            </a:endParaRPr>
+          </a:p>
+          <a:p>
+            <a:pPr lvl="1"/>
+            <a:r>
+              <a:rPr lang="en-US" sz="2600" b="1" dirty="0" err="1">
+                <a:latin typeface="Arial" panose="020B0604020202020204" pitchFamily="34" charset="0"/>
+                <a:cs typeface="Arial" panose="020B0604020202020204" pitchFamily="34" charset="0"/>
+              </a:rPr>
+              <a:t>ratna</a:t>
+            </a:r>
+            <a:r>
+              <a:rPr lang="en-US" sz="2600" b="1" dirty="0">
+                <a:latin typeface="Arial" panose="020B0604020202020204" pitchFamily="34" charset="0"/>
+                <a:cs typeface="Arial" panose="020B0604020202020204" pitchFamily="34" charset="0"/>
+              </a:rPr>
+              <a:t> </a:t>
+            </a:r>
+            <a:r>
+              <a:rPr lang="en-US" sz="2600" b="1" dirty="0" err="1">
+                <a:latin typeface="Arial" panose="020B0604020202020204" pitchFamily="34" charset="0"/>
+                <a:cs typeface="Arial" panose="020B0604020202020204" pitchFamily="34" charset="0"/>
+              </a:rPr>
+              <a:t>dhada+mam</a:t>
+            </a:r>
+            <a:endParaRPr lang="en-US" sz="2600" b="1" dirty="0">
+              <a:latin typeface="Arial" panose="020B0604020202020204" pitchFamily="34" charset="0"/>
+              <a:cs typeface="Arial" panose="020B0604020202020204" pitchFamily="34" charset="0"/>
+            </a:endParaRPr>
+          </a:p>
+          <a:p>
+            <a:pPr lvl="1"/>
+            <a:r>
+              <a:rPr lang="en-US" sz="2600" b="1" dirty="0" err="1">
+                <a:latin typeface="Arial" panose="020B0604020202020204" pitchFamily="34" charset="0"/>
+                <a:cs typeface="Arial" panose="020B0604020202020204" pitchFamily="34" charset="0"/>
+              </a:rPr>
+              <a:t>kakShivantam</a:t>
+            </a:r>
+            <a:r>
+              <a:rPr lang="en-US" sz="2600" b="1" dirty="0">
+                <a:latin typeface="Arial" panose="020B0604020202020204" pitchFamily="34" charset="0"/>
+                <a:cs typeface="Arial" panose="020B0604020202020204" pitchFamily="34" charset="0"/>
+              </a:rPr>
+              <a:t> ya </a:t>
+            </a:r>
+            <a:r>
+              <a:rPr lang="en-US" sz="2600" b="1" dirty="0" err="1">
+                <a:latin typeface="Arial" panose="020B0604020202020204" pitchFamily="34" charset="0"/>
+                <a:cs typeface="Arial" panose="020B0604020202020204" pitchFamily="34" charset="0"/>
+              </a:rPr>
+              <a:t>aushijam</a:t>
+            </a:r>
+            <a:endParaRPr lang="en-US" sz="2600" b="1" dirty="0">
+              <a:latin typeface="Arial" panose="020B0604020202020204" pitchFamily="34" charset="0"/>
+              <a:cs typeface="Arial" panose="020B0604020202020204" pitchFamily="34" charset="0"/>
+            </a:endParaRPr>
+          </a:p>
+          <a:p>
+            <a:pPr lvl="1"/>
+            <a:r>
+              <a:rPr lang="en-US" sz="2600" b="1" dirty="0" err="1">
+                <a:latin typeface="Arial" panose="020B0604020202020204" pitchFamily="34" charset="0"/>
+                <a:cs typeface="Arial" panose="020B0604020202020204" pitchFamily="34" charset="0"/>
+              </a:rPr>
+              <a:t>ahAr.sham</a:t>
+            </a:r>
+            <a:r>
+              <a:rPr lang="en-US" sz="2600" b="1" dirty="0">
+                <a:latin typeface="Arial" panose="020B0604020202020204" pitchFamily="34" charset="0"/>
+                <a:cs typeface="Arial" panose="020B0604020202020204" pitchFamily="34" charset="0"/>
+              </a:rPr>
+              <a:t> </a:t>
+            </a:r>
+            <a:r>
+              <a:rPr lang="en-US" sz="2600" b="1" dirty="0" err="1">
+                <a:latin typeface="Arial" panose="020B0604020202020204" pitchFamily="34" charset="0"/>
+                <a:cs typeface="Arial" panose="020B0604020202020204" pitchFamily="34" charset="0"/>
+              </a:rPr>
+              <a:t>dvAviSham</a:t>
+            </a:r>
+            <a:r>
+              <a:rPr lang="en-US" sz="2600" b="1" dirty="0">
+                <a:latin typeface="Arial" panose="020B0604020202020204" pitchFamily="34" charset="0"/>
+                <a:cs typeface="Arial" panose="020B0604020202020204" pitchFamily="34" charset="0"/>
+              </a:rPr>
+              <a:t> </a:t>
+            </a:r>
+            <a:r>
+              <a:rPr lang="en-US" sz="2600" b="1" dirty="0" err="1">
+                <a:latin typeface="Arial" panose="020B0604020202020204" pitchFamily="34" charset="0"/>
+                <a:cs typeface="Arial" panose="020B0604020202020204" pitchFamily="34" charset="0"/>
+              </a:rPr>
+              <a:t>tvA</a:t>
+            </a:r>
+            <a:r>
+              <a:rPr lang="en-US" sz="2600" b="1" dirty="0">
+                <a:latin typeface="Arial" panose="020B0604020202020204" pitchFamily="34" charset="0"/>
+                <a:cs typeface="Arial" panose="020B0604020202020204" pitchFamily="34" charset="0"/>
+              </a:rPr>
+              <a:t> </a:t>
+            </a:r>
+            <a:r>
+              <a:rPr lang="en-US" sz="2600" b="1" dirty="0" err="1">
+                <a:latin typeface="Arial" panose="020B0604020202020204" pitchFamily="34" charset="0"/>
+                <a:cs typeface="Arial" panose="020B0604020202020204" pitchFamily="34" charset="0"/>
+              </a:rPr>
+              <a:t>punarAgA</a:t>
+            </a:r>
+            <a:endParaRPr lang="en-US" sz="2600" b="1" dirty="0">
+              <a:latin typeface="Arial" panose="020B0604020202020204" pitchFamily="34" charset="0"/>
+              <a:cs typeface="Arial" panose="020B0604020202020204" pitchFamily="34" charset="0"/>
+            </a:endParaRPr>
+          </a:p>
+          <a:p>
+            <a:r>
+              <a:rPr lang="en-US" sz="2800" b="1" dirty="0">
+                <a:latin typeface="Arial" panose="020B0604020202020204" pitchFamily="34" charset="0"/>
+                <a:cs typeface="Arial" panose="020B0604020202020204" pitchFamily="34" charset="0"/>
+              </a:rPr>
+              <a:t>Rendering Styles differ between Schools</a:t>
+            </a:r>
+          </a:p>
+          <a:p>
+            <a:pPr lvl="1"/>
+            <a:r>
+              <a:rPr lang="en-US" sz="2600" b="1" dirty="0">
+                <a:latin typeface="Arial" panose="020B0604020202020204" pitchFamily="34" charset="0"/>
+                <a:cs typeface="Arial" panose="020B0604020202020204" pitchFamily="34" charset="0"/>
+              </a:rPr>
+              <a:t>Adapt Ruk </a:t>
+            </a:r>
+            <a:r>
+              <a:rPr lang="en-US" sz="2600" b="1" dirty="0" err="1">
+                <a:latin typeface="Arial" panose="020B0604020202020204" pitchFamily="34" charset="0"/>
+                <a:cs typeface="Arial" panose="020B0604020202020204" pitchFamily="34" charset="0"/>
+              </a:rPr>
+              <a:t>veda</a:t>
+            </a:r>
+            <a:r>
+              <a:rPr lang="en-US" sz="2600" b="1" dirty="0">
+                <a:latin typeface="Arial" panose="020B0604020202020204" pitchFamily="34" charset="0"/>
+                <a:cs typeface="Arial" panose="020B0604020202020204" pitchFamily="34" charset="0"/>
+              </a:rPr>
+              <a:t> </a:t>
+            </a:r>
+            <a:r>
+              <a:rPr lang="en-US" sz="2600" b="1" dirty="0" err="1">
+                <a:latin typeface="Arial" panose="020B0604020202020204" pitchFamily="34" charset="0"/>
+                <a:cs typeface="Arial" panose="020B0604020202020204" pitchFamily="34" charset="0"/>
+              </a:rPr>
+              <a:t>MantrAs</a:t>
+            </a:r>
+            <a:r>
+              <a:rPr lang="en-US" sz="2600" b="1" dirty="0">
+                <a:latin typeface="Arial" panose="020B0604020202020204" pitchFamily="34" charset="0"/>
+                <a:cs typeface="Arial" panose="020B0604020202020204" pitchFamily="34" charset="0"/>
+              </a:rPr>
+              <a:t> to KYV style or vice versa</a:t>
+            </a:r>
+          </a:p>
+          <a:p>
+            <a:pPr lvl="1"/>
+            <a:endParaRPr lang="en-US" sz="2600" b="1" dirty="0">
+              <a:latin typeface="Arial" panose="020B0604020202020204" pitchFamily="34" charset="0"/>
+              <a:cs typeface="Arial" panose="020B0604020202020204" pitchFamily="34" charset="0"/>
+            </a:endParaRPr>
+          </a:p>
+        </p:txBody>
+      </p:sp>
+    </p:spTree>
+    <p:extLst>
+      <p:ext uri="{BB962C8B-B14F-4D97-AF65-F5344CB8AC3E}">
+        <p14:creationId xmlns:p14="http://schemas.microsoft.com/office/powerpoint/2010/main" val="602889465"/>
       </p:ext>
     </p:extLst>
   </p:cSld>

</xml_diff>

<commit_message>
TS 3.2, 3.3 Template After Ghanam hearing - 10/04/2022
</commit_message>
<xml_diff>
--- a/Veda Lectures/Dheerga Swaritam.pptx
+++ b/Veda Lectures/Dheerga Swaritam.pptx
@@ -455,7 +455,7 @@
             <a:fld id="{5923F103-BC34-4FE4-A40E-EDDEECFDA5D0}" type="datetimeFigureOut">
               <a:rPr lang="en-US" dirty="0"/>
               <a:pPr/>
-              <a:t>4/5/2022</a:t>
+              <a:t>4/10/2022</a:t>
             </a:fld>
             <a:endParaRPr lang="en-US" dirty="0"/>
           </a:p>
@@ -1543,7 +1543,7 @@
           <a:p>
             <a:fld id="{923A1CC3-2375-41D4-9E03-427CAF2A4C1A}" type="datetimeFigureOut">
               <a:rPr lang="en-US" dirty="0"/>
-              <a:t>4/5/2022</a:t>
+              <a:t>4/10/2022</a:t>
             </a:fld>
             <a:endParaRPr lang="en-US" dirty="0"/>
           </a:p>
@@ -2523,7 +2523,7 @@
           <a:p>
             <a:fld id="{AFF16868-8199-4C2C-A5B1-63AEE139F88E}" type="datetimeFigureOut">
               <a:rPr lang="en-US" dirty="0"/>
-              <a:t>4/5/2022</a:t>
+              <a:t>4/10/2022</a:t>
             </a:fld>
             <a:endParaRPr lang="en-US" dirty="0"/>
           </a:p>
@@ -3657,7 +3657,7 @@
           <a:p>
             <a:fld id="{AAD9FF7F-6988-44CC-821B-644E70CD2F73}" type="datetimeFigureOut">
               <a:rPr lang="en-US" dirty="0"/>
-              <a:t>4/5/2022</a:t>
+              <a:t>4/10/2022</a:t>
             </a:fld>
             <a:endParaRPr lang="en-US" dirty="0"/>
           </a:p>
@@ -4690,7 +4690,7 @@
           <a:p>
             <a:fld id="{5C12C299-16B2-4475-990D-751901EACC14}" type="datetimeFigureOut">
               <a:rPr lang="en-US" dirty="0"/>
-              <a:t>4/5/2022</a:t>
+              <a:t>4/10/2022</a:t>
             </a:fld>
             <a:endParaRPr lang="en-US" dirty="0"/>
           </a:p>
@@ -5350,7 +5350,7 @@
           <a:p>
             <a:fld id="{9FE86839-B9D8-4651-8783-F325ECE74E65}" type="datetimeFigureOut">
               <a:rPr lang="en-US" dirty="0"/>
-              <a:t>4/5/2022</a:t>
+              <a:t>4/10/2022</a:t>
             </a:fld>
             <a:endParaRPr lang="en-US" dirty="0"/>
           </a:p>
@@ -6211,7 +6211,7 @@
           <a:p>
             <a:fld id="{FD484F64-32F6-45C5-931F-ADC1662401D0}" type="datetimeFigureOut">
               <a:rPr lang="en-US" dirty="0"/>
-              <a:t>4/5/2022</a:t>
+              <a:t>4/10/2022</a:t>
             </a:fld>
             <a:endParaRPr lang="en-US" dirty="0"/>
           </a:p>
@@ -6401,7 +6401,7 @@
           <a:p>
             <a:fld id="{53086D93-FCAC-47E0-A2EE-787E62CA814C}" type="datetimeFigureOut">
               <a:rPr lang="en-US" dirty="0"/>
-              <a:t>4/5/2022</a:t>
+              <a:t>4/10/2022</a:t>
             </a:fld>
             <a:endParaRPr lang="en-US" dirty="0"/>
           </a:p>
@@ -7373,7 +7373,7 @@
           <a:p>
             <a:fld id="{CDA879A6-0FD0-4734-A311-86BFCA472E6E}" type="datetimeFigureOut">
               <a:rPr lang="en-US" dirty="0"/>
-              <a:t>4/5/2022</a:t>
+              <a:t>4/10/2022</a:t>
             </a:fld>
             <a:endParaRPr lang="en-US" dirty="0"/>
           </a:p>
@@ -7584,7 +7584,7 @@
           <a:p>
             <a:fld id="{19C9CA7B-DFD4-44B5-8C60-D14B8CD1FB59}" type="datetimeFigureOut">
               <a:rPr lang="en-US" dirty="0"/>
-              <a:t>4/5/2022</a:t>
+              <a:t>4/10/2022</a:t>
             </a:fld>
             <a:endParaRPr lang="en-US" dirty="0"/>
           </a:p>
@@ -8618,7 +8618,7 @@
           <a:p>
             <a:fld id="{F34E6425-0181-43F2-84FC-787E803FD2F8}" type="datetimeFigureOut">
               <a:rPr lang="en-US" dirty="0"/>
-              <a:t>4/5/2022</a:t>
+              <a:t>4/10/2022</a:t>
             </a:fld>
             <a:endParaRPr lang="en-US" dirty="0"/>
           </a:p>
@@ -8890,7 +8890,7 @@
           <a:p>
             <a:fld id="{3BDB8791-F1B0-41E7-B7FD-A781E65C4266}" type="datetimeFigureOut">
               <a:rPr lang="en-US" dirty="0"/>
-              <a:t>4/5/2022</a:t>
+              <a:t>4/10/2022</a:t>
             </a:fld>
             <a:endParaRPr lang="en-US" dirty="0"/>
           </a:p>
@@ -9300,7 +9300,7 @@
           <a:p>
             <a:fld id="{5FDD63B2-E120-4ED8-B27B-C685F510A5FE}" type="datetimeFigureOut">
               <a:rPr lang="en-US" dirty="0"/>
-              <a:t>4/5/2022</a:t>
+              <a:t>4/10/2022</a:t>
             </a:fld>
             <a:endParaRPr lang="en-US" dirty="0"/>
           </a:p>
@@ -9427,7 +9427,7 @@
           <a:p>
             <a:fld id="{7AA18ACC-A947-437B-A130-35BD54FDF1E9}" type="datetimeFigureOut">
               <a:rPr lang="en-US" dirty="0"/>
-              <a:t>4/5/2022</a:t>
+              <a:t>4/10/2022</a:t>
             </a:fld>
             <a:endParaRPr lang="en-US" dirty="0"/>
           </a:p>
@@ -9522,7 +9522,7 @@
           <a:p>
             <a:fld id="{7C8D7E02-BCB8-4D50-A234-369438C08659}" type="datetimeFigureOut">
               <a:rPr lang="en-US" dirty="0"/>
-              <a:t>4/5/2022</a:t>
+              <a:t>4/10/2022</a:t>
             </a:fld>
             <a:endParaRPr lang="en-US" dirty="0"/>
           </a:p>
@@ -10603,7 +10603,7 @@
           <a:p>
             <a:fld id="{76E86A4C-8E40-4F87-A4F0-01A0687C5742}" type="datetimeFigureOut">
               <a:rPr lang="en-US" dirty="0"/>
-              <a:t>4/5/2022</a:t>
+              <a:t>4/10/2022</a:t>
             </a:fld>
             <a:endParaRPr lang="en-US" dirty="0"/>
           </a:p>
@@ -11711,7 +11711,7 @@
           <a:p>
             <a:fld id="{35E72C73-2D91-4E12-BA25-F0AA0C03599B}" type="datetimeFigureOut">
               <a:rPr lang="en-US" dirty="0"/>
-              <a:t>4/5/2022</a:t>
+              <a:t>4/10/2022</a:t>
             </a:fld>
             <a:endParaRPr lang="en-US" dirty="0"/>
           </a:p>
@@ -12708,7 +12708,7 @@
           <a:p>
             <a:fld id="{2BE451C3-0FF4-47C4-B829-773ADF60F88C}" type="datetimeFigureOut">
               <a:rPr lang="en-US" dirty="0"/>
-              <a:t>4/5/2022</a:t>
+              <a:t>4/10/2022</a:t>
             </a:fld>
             <a:endParaRPr lang="en-US" dirty="0"/>
           </a:p>
@@ -13278,7 +13278,12 @@
             <p:ph type="ctrTitle"/>
           </p:nvPr>
         </p:nvSpPr>
-        <p:spPr/>
+        <p:spPr>
+          <a:xfrm>
+            <a:off x="1344141" y="741796"/>
+            <a:ext cx="8052107" cy="1985638"/>
+          </a:xfrm>
+        </p:spPr>
         <p:txBody>
           <a:bodyPr/>
           <a:lstStyle/>
@@ -13300,14 +13305,62 @@
             <p:ph type="subTitle" idx="1"/>
           </p:nvPr>
         </p:nvSpPr>
-        <p:spPr/>
+        <p:spPr>
+          <a:xfrm>
+            <a:off x="1198179" y="3846786"/>
+            <a:ext cx="8782434" cy="1792014"/>
+          </a:xfrm>
+        </p:spPr>
         <p:txBody>
-          <a:bodyPr/>
+          <a:bodyPr>
+            <a:normAutofit/>
+          </a:bodyPr>
           <a:lstStyle/>
           <a:p>
             <a:r>
               <a:rPr lang="en-US" dirty="0"/>
-              <a:t>Veda VMS</a:t>
+              <a:t>Link to article in Website:  </a:t>
+            </a:r>
+            <a:r>
+              <a:rPr lang="en-US" b="1" dirty="0">
+                <a:solidFill>
+                  <a:schemeClr val="bg1"/>
+                </a:solidFill>
+                <a:latin typeface="Arial" panose="020B0604020202020204" pitchFamily="34" charset="0"/>
+                <a:cs typeface="Arial" panose="020B0604020202020204" pitchFamily="34" charset="0"/>
+              </a:rPr>
+              <a:t>www.vedavms.in</a:t>
+            </a:r>
+          </a:p>
+          <a:p>
+            <a:r>
+              <a:rPr lang="en-US" sz="2400" b="1" dirty="0">
+                <a:solidFill>
+                  <a:schemeClr val="bg1"/>
+                </a:solidFill>
+                <a:latin typeface="Arial" panose="020B0604020202020204" pitchFamily="34" charset="0"/>
+                <a:cs typeface="Arial" panose="020B0604020202020204" pitchFamily="34" charset="0"/>
+              </a:rPr>
+              <a:t>http://vedavms.in/docs/articles/02Basics%20of%</a:t>
+            </a:r>
+            <a:br>
+              <a:rPr lang="en-US" sz="2400" b="1" dirty="0">
+                <a:solidFill>
+                  <a:schemeClr val="bg1"/>
+                </a:solidFill>
+                <a:latin typeface="Arial" panose="020B0604020202020204" pitchFamily="34" charset="0"/>
+                <a:cs typeface="Arial" panose="020B0604020202020204" pitchFamily="34" charset="0"/>
+              </a:rPr>
+            </a:br>
+            <a:r>
+              <a:rPr lang="en-US" sz="2400" b="1" dirty="0">
+                <a:solidFill>
+                  <a:schemeClr val="bg1"/>
+                </a:solidFill>
+                <a:latin typeface="Arial" panose="020B0604020202020204" pitchFamily="34" charset="0"/>
+                <a:cs typeface="Arial" panose="020B0604020202020204" pitchFamily="34" charset="0"/>
+              </a:rPr>
+              <a:t>20Veda-Dheerga%20Swaritam.pdf</a:t>
             </a:r>
           </a:p>
         </p:txBody>
@@ -14039,6 +14092,30 @@
               </a:rPr>
               <a:t>$</a:t>
             </a:r>
+          </a:p>
+          <a:p>
+            <a:pPr lvl="1"/>
+            <a:r>
+              <a:rPr lang="en-US" sz="2600" b="1" dirty="0">
+                <a:latin typeface="Arial" panose="020B0604020202020204" pitchFamily="34" charset="0"/>
+                <a:cs typeface="Arial" panose="020B0604020202020204" pitchFamily="34" charset="0"/>
+              </a:rPr>
+              <a:t>Recital difference in letters ending with ‘n’ like </a:t>
+            </a:r>
+            <a:r>
+              <a:rPr lang="en-US" sz="2600" b="1" dirty="0" err="1">
+                <a:latin typeface="Arial" panose="020B0604020202020204" pitchFamily="34" charset="0"/>
+                <a:cs typeface="Arial" panose="020B0604020202020204" pitchFamily="34" charset="0"/>
+              </a:rPr>
+              <a:t>sarvAn</a:t>
+            </a:r>
+            <a:r>
+              <a:rPr lang="en-US" sz="2600" b="1" dirty="0">
+                <a:latin typeface="Arial" panose="020B0604020202020204" pitchFamily="34" charset="0"/>
+                <a:cs typeface="Arial" panose="020B0604020202020204" pitchFamily="34" charset="0"/>
+              </a:rPr>
+              <a:t>#</a:t>
+            </a:r>
             <a:endParaRPr lang="en-IN" sz="2600" b="1" dirty="0">
               <a:latin typeface="Arial" panose="020B0604020202020204" pitchFamily="34" charset="0"/>
               <a:cs typeface="Arial" panose="020B0604020202020204" pitchFamily="34" charset="0"/>
@@ -14560,10 +14637,13 @@
               </a:rPr>
               <a:t>dhada+mam</a:t>
             </a:r>
-            <a:endParaRPr lang="en-US" sz="2600" b="1" dirty="0">
-              <a:latin typeface="Arial" panose="020B0604020202020204" pitchFamily="34" charset="0"/>
-              <a:cs typeface="Arial" panose="020B0604020202020204" pitchFamily="34" charset="0"/>
-            </a:endParaRPr>
+            <a:r>
+              <a:rPr lang="en-US" sz="2600" b="1" dirty="0">
+                <a:latin typeface="Arial" panose="020B0604020202020204" pitchFamily="34" charset="0"/>
+                <a:cs typeface="Arial" panose="020B0604020202020204" pitchFamily="34" charset="0"/>
+              </a:rPr>
+              <a:t> </a:t>
+            </a:r>
           </a:p>
           <a:p>
             <a:pPr lvl="1"/>
@@ -14586,7 +14666,7 @@
                 <a:latin typeface="Arial" panose="020B0604020202020204" pitchFamily="34" charset="0"/>
                 <a:cs typeface="Arial" panose="020B0604020202020204" pitchFamily="34" charset="0"/>
               </a:rPr>
-              <a:t>aushijam</a:t>
+              <a:t>au$shijam</a:t>
             </a:r>
             <a:endParaRPr lang="en-US" sz="2600" b="1" dirty="0">
               <a:latin typeface="Arial" panose="020B0604020202020204" pitchFamily="34" charset="0"/>
@@ -14665,35 +14745,7 @@
                 <a:latin typeface="Arial" panose="020B0604020202020204" pitchFamily="34" charset="0"/>
                 <a:cs typeface="Arial" panose="020B0604020202020204" pitchFamily="34" charset="0"/>
               </a:rPr>
-              <a:t>Adapt Ruk </a:t>
-            </a:r>
-            <a:r>
-              <a:rPr lang="en-US" sz="2600" b="1" dirty="0" err="1">
-                <a:latin typeface="Arial" panose="020B0604020202020204" pitchFamily="34" charset="0"/>
-                <a:cs typeface="Arial" panose="020B0604020202020204" pitchFamily="34" charset="0"/>
-              </a:rPr>
-              <a:t>veda</a:t>
-            </a:r>
-            <a:r>
-              <a:rPr lang="en-US" sz="2600" b="1" dirty="0">
-                <a:latin typeface="Arial" panose="020B0604020202020204" pitchFamily="34" charset="0"/>
-                <a:cs typeface="Arial" panose="020B0604020202020204" pitchFamily="34" charset="0"/>
-              </a:rPr>
-              <a:t> </a:t>
-            </a:r>
-            <a:r>
-              <a:rPr lang="en-US" sz="2600" b="1" dirty="0" err="1">
-                <a:latin typeface="Arial" panose="020B0604020202020204" pitchFamily="34" charset="0"/>
-                <a:cs typeface="Arial" panose="020B0604020202020204" pitchFamily="34" charset="0"/>
-              </a:rPr>
-              <a:t>MantrAs</a:t>
-            </a:r>
-            <a:r>
-              <a:rPr lang="en-US" sz="2600" b="1" dirty="0">
-                <a:latin typeface="Arial" panose="020B0604020202020204" pitchFamily="34" charset="0"/>
-                <a:cs typeface="Arial" panose="020B0604020202020204" pitchFamily="34" charset="0"/>
-              </a:rPr>
-              <a:t> to KYV style or vice versa</a:t>
+              <a:t>Adapt Ruk Veda MantrAs to KYV style or vice versa</a:t>
             </a:r>
           </a:p>
           <a:p>

</xml_diff>

<commit_message>
TS Templates and Dheerga Swaritam - 15/04/2022
</commit_message>
<xml_diff>
--- a/Veda Lectures/Dheerga Swaritam.pptx
+++ b/Veda Lectures/Dheerga Swaritam.pptx
@@ -455,7 +455,7 @@
             <a:fld id="{5923F103-BC34-4FE4-A40E-EDDEECFDA5D0}" type="datetimeFigureOut">
               <a:rPr lang="en-US" dirty="0"/>
               <a:pPr/>
-              <a:t>4/10/2022</a:t>
+              <a:t>4/14/2022</a:t>
             </a:fld>
             <a:endParaRPr lang="en-US" dirty="0"/>
           </a:p>
@@ -1543,7 +1543,7 @@
           <a:p>
             <a:fld id="{923A1CC3-2375-41D4-9E03-427CAF2A4C1A}" type="datetimeFigureOut">
               <a:rPr lang="en-US" dirty="0"/>
-              <a:t>4/10/2022</a:t>
+              <a:t>4/14/2022</a:t>
             </a:fld>
             <a:endParaRPr lang="en-US" dirty="0"/>
           </a:p>
@@ -2523,7 +2523,7 @@
           <a:p>
             <a:fld id="{AFF16868-8199-4C2C-A5B1-63AEE139F88E}" type="datetimeFigureOut">
               <a:rPr lang="en-US" dirty="0"/>
-              <a:t>4/10/2022</a:t>
+              <a:t>4/14/2022</a:t>
             </a:fld>
             <a:endParaRPr lang="en-US" dirty="0"/>
           </a:p>
@@ -3657,7 +3657,7 @@
           <a:p>
             <a:fld id="{AAD9FF7F-6988-44CC-821B-644E70CD2F73}" type="datetimeFigureOut">
               <a:rPr lang="en-US" dirty="0"/>
-              <a:t>4/10/2022</a:t>
+              <a:t>4/14/2022</a:t>
             </a:fld>
             <a:endParaRPr lang="en-US" dirty="0"/>
           </a:p>
@@ -4690,7 +4690,7 @@
           <a:p>
             <a:fld id="{5C12C299-16B2-4475-990D-751901EACC14}" type="datetimeFigureOut">
               <a:rPr lang="en-US" dirty="0"/>
-              <a:t>4/10/2022</a:t>
+              <a:t>4/14/2022</a:t>
             </a:fld>
             <a:endParaRPr lang="en-US" dirty="0"/>
           </a:p>
@@ -5350,7 +5350,7 @@
           <a:p>
             <a:fld id="{9FE86839-B9D8-4651-8783-F325ECE74E65}" type="datetimeFigureOut">
               <a:rPr lang="en-US" dirty="0"/>
-              <a:t>4/10/2022</a:t>
+              <a:t>4/14/2022</a:t>
             </a:fld>
             <a:endParaRPr lang="en-US" dirty="0"/>
           </a:p>
@@ -6211,7 +6211,7 @@
           <a:p>
             <a:fld id="{FD484F64-32F6-45C5-931F-ADC1662401D0}" type="datetimeFigureOut">
               <a:rPr lang="en-US" dirty="0"/>
-              <a:t>4/10/2022</a:t>
+              <a:t>4/14/2022</a:t>
             </a:fld>
             <a:endParaRPr lang="en-US" dirty="0"/>
           </a:p>
@@ -6401,7 +6401,7 @@
           <a:p>
             <a:fld id="{53086D93-FCAC-47E0-A2EE-787E62CA814C}" type="datetimeFigureOut">
               <a:rPr lang="en-US" dirty="0"/>
-              <a:t>4/10/2022</a:t>
+              <a:t>4/14/2022</a:t>
             </a:fld>
             <a:endParaRPr lang="en-US" dirty="0"/>
           </a:p>
@@ -7373,7 +7373,7 @@
           <a:p>
             <a:fld id="{CDA879A6-0FD0-4734-A311-86BFCA472E6E}" type="datetimeFigureOut">
               <a:rPr lang="en-US" dirty="0"/>
-              <a:t>4/10/2022</a:t>
+              <a:t>4/14/2022</a:t>
             </a:fld>
             <a:endParaRPr lang="en-US" dirty="0"/>
           </a:p>
@@ -7584,7 +7584,7 @@
           <a:p>
             <a:fld id="{19C9CA7B-DFD4-44B5-8C60-D14B8CD1FB59}" type="datetimeFigureOut">
               <a:rPr lang="en-US" dirty="0"/>
-              <a:t>4/10/2022</a:t>
+              <a:t>4/14/2022</a:t>
             </a:fld>
             <a:endParaRPr lang="en-US" dirty="0"/>
           </a:p>
@@ -8618,7 +8618,7 @@
           <a:p>
             <a:fld id="{F34E6425-0181-43F2-84FC-787E803FD2F8}" type="datetimeFigureOut">
               <a:rPr lang="en-US" dirty="0"/>
-              <a:t>4/10/2022</a:t>
+              <a:t>4/14/2022</a:t>
             </a:fld>
             <a:endParaRPr lang="en-US" dirty="0"/>
           </a:p>
@@ -8890,7 +8890,7 @@
           <a:p>
             <a:fld id="{3BDB8791-F1B0-41E7-B7FD-A781E65C4266}" type="datetimeFigureOut">
               <a:rPr lang="en-US" dirty="0"/>
-              <a:t>4/10/2022</a:t>
+              <a:t>4/14/2022</a:t>
             </a:fld>
             <a:endParaRPr lang="en-US" dirty="0"/>
           </a:p>
@@ -9300,7 +9300,7 @@
           <a:p>
             <a:fld id="{5FDD63B2-E120-4ED8-B27B-C685F510A5FE}" type="datetimeFigureOut">
               <a:rPr lang="en-US" dirty="0"/>
-              <a:t>4/10/2022</a:t>
+              <a:t>4/14/2022</a:t>
             </a:fld>
             <a:endParaRPr lang="en-US" dirty="0"/>
           </a:p>
@@ -9427,7 +9427,7 @@
           <a:p>
             <a:fld id="{7AA18ACC-A947-437B-A130-35BD54FDF1E9}" type="datetimeFigureOut">
               <a:rPr lang="en-US" dirty="0"/>
-              <a:t>4/10/2022</a:t>
+              <a:t>4/14/2022</a:t>
             </a:fld>
             <a:endParaRPr lang="en-US" dirty="0"/>
           </a:p>
@@ -9522,7 +9522,7 @@
           <a:p>
             <a:fld id="{7C8D7E02-BCB8-4D50-A234-369438C08659}" type="datetimeFigureOut">
               <a:rPr lang="en-US" dirty="0"/>
-              <a:t>4/10/2022</a:t>
+              <a:t>4/14/2022</a:t>
             </a:fld>
             <a:endParaRPr lang="en-US" dirty="0"/>
           </a:p>
@@ -10603,7 +10603,7 @@
           <a:p>
             <a:fld id="{76E86A4C-8E40-4F87-A4F0-01A0687C5742}" type="datetimeFigureOut">
               <a:rPr lang="en-US" dirty="0"/>
-              <a:t>4/10/2022</a:t>
+              <a:t>4/14/2022</a:t>
             </a:fld>
             <a:endParaRPr lang="en-US" dirty="0"/>
           </a:p>
@@ -11711,7 +11711,7 @@
           <a:p>
             <a:fld id="{35E72C73-2D91-4E12-BA25-F0AA0C03599B}" type="datetimeFigureOut">
               <a:rPr lang="en-US" dirty="0"/>
-              <a:t>4/10/2022</a:t>
+              <a:t>4/14/2022</a:t>
             </a:fld>
             <a:endParaRPr lang="en-US" dirty="0"/>
           </a:p>
@@ -12708,7 +12708,7 @@
           <a:p>
             <a:fld id="{2BE451C3-0FF4-47C4-B829-773ADF60F88C}" type="datetimeFigureOut">
               <a:rPr lang="en-US" dirty="0"/>
-              <a:t>4/10/2022</a:t>
+              <a:t>4/14/2022</a:t>
             </a:fld>
             <a:endParaRPr lang="en-US" dirty="0"/>
           </a:p>

</xml_diff>